<commit_message>
fixed error in diagram
</commit_message>
<xml_diff>
--- a/11_notes.pptx
+++ b/11_notes.pptx
@@ -109,6 +109,11 @@
       </a:defRPr>
     </a:lvl9pPr>
   </p:defaultTextStyle>
+  <p:extLst>
+    <p:ext uri="{EFAFB233-063F-42B5-8137-9DF3F51BA10A}">
+      <p15:sldGuideLst xmlns:p15="http://schemas.microsoft.com/office/powerpoint/2012/main"/>
+    </p:ext>
+  </p:extLst>
 </p:presentation>
 </file>
 
@@ -12734,7 +12739,7 @@
                     <a:schemeClr val="tx1"/>
                   </a:solidFill>
                 </a:rPr>
-                <a:t>y(?)</a:t>
+                <a:t>outputs</a:t>
               </a:r>
             </a:p>
           </p:txBody>
@@ -13772,12 +13777,52 @@
           <a:chExt cx="0" cy="0"/>
         </a:xfrm>
       </p:grpSpPr>
+      <p:sp>
+        <p:nvSpPr>
+          <p:cNvPr id="3" name="TextBox 2">
+            <a:extLst>
+              <a:ext uri="{FF2B5EF4-FFF2-40B4-BE49-F238E27FC236}">
+                <a16:creationId xmlns:a16="http://schemas.microsoft.com/office/drawing/2014/main" id="{9FA604B8-3505-46A0-80EE-CC6073F4C18D}"/>
+              </a:ext>
+            </a:extLst>
+          </p:cNvPr>
+          <p:cNvSpPr txBox="1"/>
+          <p:nvPr/>
+        </p:nvSpPr>
+        <p:spPr>
+          <a:xfrm>
+            <a:off x="284615" y="496562"/>
+            <a:ext cx="1824089" cy="369332"/>
+          </a:xfrm>
+          <a:prstGeom prst="rect">
+            <a:avLst/>
+          </a:prstGeom>
+          <a:noFill/>
+        </p:spPr>
+        <p:txBody>
+          <a:bodyPr wrap="none" rtlCol="0">
+            <a:spAutoFit/>
+          </a:bodyPr>
+          <a:lstStyle/>
+          <a:p>
+            <a:r>
+              <a:rPr lang="en-US" dirty="0"/>
+              <a:t>11</a:t>
+            </a:r>
+            <a:r>
+              <a:rPr lang="en-US"/>
+              <a:t>_NOTES-FIG-01</a:t>
+            </a:r>
+            <a:endParaRPr lang="en-US" dirty="0"/>
+          </a:p>
+        </p:txBody>
+      </p:sp>
       <p:pic>
         <p:nvPicPr>
-          <p:cNvPr id="2" name="Picture 1">
-            <a:extLst>
-              <a:ext uri="{FF2B5EF4-FFF2-40B4-BE49-F238E27FC236}">
-                <a16:creationId xmlns:a16="http://schemas.microsoft.com/office/drawing/2014/main" id="{61C757E1-AC5A-4198-B184-C1B26C6E4853}"/>
+          <p:cNvPr id="53" name="Picture 52">
+            <a:extLst>
+              <a:ext uri="{FF2B5EF4-FFF2-40B4-BE49-F238E27FC236}">
+                <a16:creationId xmlns:a16="http://schemas.microsoft.com/office/drawing/2014/main" id="{E4AC9C56-88FA-413C-B018-B99D0B2BC5BC}"/>
               </a:ext>
             </a:extLst>
           </p:cNvPr>
@@ -13802,46 +13847,6 @@
           </a:prstGeom>
         </p:spPr>
       </p:pic>
-      <p:sp>
-        <p:nvSpPr>
-          <p:cNvPr id="3" name="TextBox 2">
-            <a:extLst>
-              <a:ext uri="{FF2B5EF4-FFF2-40B4-BE49-F238E27FC236}">
-                <a16:creationId xmlns:a16="http://schemas.microsoft.com/office/drawing/2014/main" id="{9FA604B8-3505-46A0-80EE-CC6073F4C18D}"/>
-              </a:ext>
-            </a:extLst>
-          </p:cNvPr>
-          <p:cNvSpPr txBox="1"/>
-          <p:nvPr/>
-        </p:nvSpPr>
-        <p:spPr>
-          <a:xfrm>
-            <a:off x="284615" y="496562"/>
-            <a:ext cx="1824089" cy="369332"/>
-          </a:xfrm>
-          <a:prstGeom prst="rect">
-            <a:avLst/>
-          </a:prstGeom>
-          <a:noFill/>
-        </p:spPr>
-        <p:txBody>
-          <a:bodyPr wrap="none" rtlCol="0">
-            <a:spAutoFit/>
-          </a:bodyPr>
-          <a:lstStyle/>
-          <a:p>
-            <a:r>
-              <a:rPr lang="en-US" dirty="0"/>
-              <a:t>11</a:t>
-            </a:r>
-            <a:r>
-              <a:rPr lang="en-US"/>
-              <a:t>_NOTES-FIG-01</a:t>
-            </a:r>
-            <a:endParaRPr lang="en-US" dirty="0"/>
-          </a:p>
-        </p:txBody>
-      </p:sp>
     </p:spTree>
     <p:extLst>
       <p:ext uri="{BB962C8B-B14F-4D97-AF65-F5344CB8AC3E}">

</xml_diff>